<commit_message>
added new version of the presentation
</commit_message>
<xml_diff>
--- a/Presentation/Presentation.pptx
+++ b/Presentation/Presentation.pptx
@@ -2,13 +2,15 @@
 <file path=ppt/presentation.xml><?xml version="1.0" encoding="utf-8"?>
 <p:presentation xmlns:a="http://schemas.openxmlformats.org/drawingml/2006/main" xmlns:r="http://schemas.openxmlformats.org/officeDocument/2006/relationships" xmlns:p="http://schemas.openxmlformats.org/presentationml/2006/main" saveSubsetFonts="1">
   <p:sldMasterIdLst>
-    <p:sldMasterId id="2147483786" r:id="rId1"/>
+    <p:sldMasterId id="2147483786" r:id="rId2"/>
   </p:sldMasterIdLst>
   <p:sldIdLst>
-    <p:sldId id="256" r:id="rId2"/>
-    <p:sldId id="257" r:id="rId3"/>
-    <p:sldId id="258" r:id="rId4"/>
-    <p:sldId id="259" r:id="rId5"/>
+    <p:sldId id="256" r:id="rId3"/>
+    <p:sldId id="260" r:id="rId4"/>
+    <p:sldId id="257" r:id="rId5"/>
+    <p:sldId id="258" r:id="rId6"/>
+    <p:sldId id="259" r:id="rId7"/>
+    <p:sldId id="261" r:id="rId8"/>
   </p:sldIdLst>
   <p:sldSz cx="12192000" cy="6858000"/>
   <p:notesSz cx="6858000" cy="9144000"/>
@@ -307,7 +309,7 @@
           <a:p>
             <a:fld id="{4AAD347D-5ACD-4C99-B74B-A9C85AD731AF}" type="datetimeFigureOut">
               <a:rPr lang="en-US" dirty="0"/>
-              <a:t>12/12/2019</a:t>
+              <a:t>12/18/2019</a:t>
             </a:fld>
             <a:endParaRPr lang="en-US" dirty="0"/>
           </a:p>
@@ -577,7 +579,7 @@
           <a:p>
             <a:fld id="{4509A250-FF31-4206-8172-F9D3106AACB1}" type="datetimeFigureOut">
               <a:rPr lang="en-US" dirty="0"/>
-              <a:t>12/12/2019</a:t>
+              <a:t>12/18/2019</a:t>
             </a:fld>
             <a:endParaRPr lang="en-US" dirty="0"/>
           </a:p>
@@ -770,7 +772,7 @@
           <a:p>
             <a:fld id="{4509A250-FF31-4206-8172-F9D3106AACB1}" type="datetimeFigureOut">
               <a:rPr lang="en-US" dirty="0"/>
-              <a:t>12/12/2019</a:t>
+              <a:t>12/18/2019</a:t>
             </a:fld>
             <a:endParaRPr lang="en-US" dirty="0"/>
           </a:p>
@@ -1042,7 +1044,7 @@
           <a:p>
             <a:fld id="{4509A250-FF31-4206-8172-F9D3106AACB1}" type="datetimeFigureOut">
               <a:rPr lang="en-US" dirty="0"/>
-              <a:t>12/12/2019</a:t>
+              <a:t>12/18/2019</a:t>
             </a:fld>
             <a:endParaRPr lang="en-US" dirty="0"/>
           </a:p>
@@ -1382,7 +1384,7 @@
           <a:p>
             <a:fld id="{4509A250-FF31-4206-8172-F9D3106AACB1}" type="datetimeFigureOut">
               <a:rPr lang="en-US" dirty="0"/>
-              <a:t>12/12/2019</a:t>
+              <a:t>12/18/2019</a:t>
             </a:fld>
             <a:endParaRPr lang="en-US" dirty="0"/>
           </a:p>
@@ -2004,7 +2006,7 @@
           <a:p>
             <a:fld id="{4509A250-FF31-4206-8172-F9D3106AACB1}" type="datetimeFigureOut">
               <a:rPr lang="en-US" dirty="0"/>
-              <a:t>12/12/2019</a:t>
+              <a:t>12/18/2019</a:t>
             </a:fld>
             <a:endParaRPr lang="en-US" dirty="0"/>
           </a:p>
@@ -2851,7 +2853,7 @@
           <a:p>
             <a:fld id="{4509A250-FF31-4206-8172-F9D3106AACB1}" type="datetimeFigureOut">
               <a:rPr lang="en-US" dirty="0"/>
-              <a:t>12/12/2019</a:t>
+              <a:t>12/18/2019</a:t>
             </a:fld>
             <a:endParaRPr lang="en-US" dirty="0"/>
           </a:p>
@@ -3019,7 +3021,7 @@
           <a:p>
             <a:fld id="{4509A250-FF31-4206-8172-F9D3106AACB1}" type="datetimeFigureOut">
               <a:rPr lang="en-US" dirty="0"/>
-              <a:t>12/12/2019</a:t>
+              <a:t>12/18/2019</a:t>
             </a:fld>
             <a:endParaRPr lang="en-US" dirty="0"/>
           </a:p>
@@ -3197,7 +3199,7 @@
           <a:p>
             <a:fld id="{4509A250-FF31-4206-8172-F9D3106AACB1}" type="datetimeFigureOut">
               <a:rPr lang="en-US" dirty="0"/>
-              <a:t>12/12/2019</a:t>
+              <a:t>12/18/2019</a:t>
             </a:fld>
             <a:endParaRPr lang="en-US" dirty="0"/>
           </a:p>
@@ -3365,7 +3367,7 @@
           <a:p>
             <a:fld id="{4509A250-FF31-4206-8172-F9D3106AACB1}" type="datetimeFigureOut">
               <a:rPr lang="en-US" dirty="0"/>
-              <a:t>12/12/2019</a:t>
+              <a:t>12/18/2019</a:t>
             </a:fld>
             <a:endParaRPr lang="en-US" dirty="0"/>
           </a:p>
@@ -3611,7 +3613,7 @@
           <a:p>
             <a:fld id="{9796027F-7875-4030-9381-8BD8C4F21935}" type="datetimeFigureOut">
               <a:rPr lang="en-US" dirty="0"/>
-              <a:t>12/12/2019</a:t>
+              <a:t>12/18/2019</a:t>
             </a:fld>
             <a:endParaRPr lang="en-US" dirty="0"/>
           </a:p>
@@ -3900,7 +3902,7 @@
           <a:p>
             <a:fld id="{9796027F-7875-4030-9381-8BD8C4F21935}" type="datetimeFigureOut">
               <a:rPr lang="en-US" dirty="0"/>
-              <a:t>12/12/2019</a:t>
+              <a:t>12/18/2019</a:t>
             </a:fld>
             <a:endParaRPr lang="en-US" dirty="0"/>
           </a:p>
@@ -4341,7 +4343,7 @@
           <a:p>
             <a:fld id="{9796027F-7875-4030-9381-8BD8C4F21935}" type="datetimeFigureOut">
               <a:rPr lang="en-US" dirty="0"/>
-              <a:t>12/12/2019</a:t>
+              <a:t>12/18/2019</a:t>
             </a:fld>
             <a:endParaRPr lang="en-US" dirty="0"/>
           </a:p>
@@ -4458,7 +4460,7 @@
           <a:p>
             <a:fld id="{4509A250-FF31-4206-8172-F9D3106AACB1}" type="datetimeFigureOut">
               <a:rPr lang="en-US" dirty="0"/>
-              <a:t>12/12/2019</a:t>
+              <a:t>12/18/2019</a:t>
             </a:fld>
             <a:endParaRPr lang="en-US" dirty="0"/>
           </a:p>
@@ -4553,7 +4555,7 @@
           <a:p>
             <a:fld id="{4509A250-FF31-4206-8172-F9D3106AACB1}" type="datetimeFigureOut">
               <a:rPr lang="en-US" dirty="0"/>
-              <a:t>12/12/2019</a:t>
+              <a:t>12/18/2019</a:t>
             </a:fld>
             <a:endParaRPr lang="en-US" dirty="0"/>
           </a:p>
@@ -4830,7 +4832,7 @@
           <a:p>
             <a:fld id="{4509A250-FF31-4206-8172-F9D3106AACB1}" type="datetimeFigureOut">
               <a:rPr lang="en-US" dirty="0"/>
-              <a:t>12/12/2019</a:t>
+              <a:t>12/18/2019</a:t>
             </a:fld>
             <a:endParaRPr lang="en-US" dirty="0"/>
           </a:p>
@@ -5100,7 +5102,7 @@
           <a:p>
             <a:fld id="{4509A250-FF31-4206-8172-F9D3106AACB1}" type="datetimeFigureOut">
               <a:rPr lang="en-US" dirty="0"/>
-              <a:t>12/12/2019</a:t>
+              <a:t>12/18/2019</a:t>
             </a:fld>
             <a:endParaRPr lang="en-US" dirty="0"/>
           </a:p>
@@ -5527,7 +5529,7 @@
           <a:p>
             <a:fld id="{4AAD347D-5ACD-4C99-B74B-A9C85AD731AF}" type="datetimeFigureOut">
               <a:rPr lang="en-US" dirty="0"/>
-              <a:t>12/12/2019</a:t>
+              <a:t>12/18/2019</a:t>
             </a:fld>
             <a:endParaRPr lang="en-US" dirty="0"/>
           </a:p>
@@ -6072,7 +6074,7 @@
                 <a16:creationId xmlns:a16="http://schemas.microsoft.com/office/drawing/2014/main" id="{A4322390-8B58-46BE-88EB-D9FD30C08743}"/>
               </a:ext>
               <a:ext uri="{C183D7F6-B498-43B3-948B-1728B52AA6E4}">
-                <adec:decorative xmlns:adec="http://schemas.microsoft.com/office/drawing/2017/decorative" val="1"/>
+                <adec:decorative xmlns:adec="http://schemas.microsoft.com/office/drawing/2017/decorative" xmlns="" val="1"/>
               </a:ext>
             </a:extLst>
           </p:cNvPr>
@@ -6185,6 +6187,14 @@
               </a:rPr>
               <a:t>See your </a:t>
             </a:r>
+            <a:r>
+              <a:rPr lang="en-GB" dirty="0">
+                <a:solidFill>
+                  <a:schemeClr val="tx1"/>
+                </a:solidFill>
+              </a:rPr>
+              <a:t/>
+            </a:r>
             <a:br>
               <a:rPr lang="en-GB" dirty="0">
                 <a:solidFill>
@@ -6253,6 +6263,63 @@
               </a:rPr>
               <a:t> in two easy steps!</a:t>
             </a:r>
+          </a:p>
+        </p:txBody>
+      </p:sp>
+      <p:sp>
+        <p:nvSpPr>
+          <p:cNvPr id="4" name="CqClassificationStamp"/>
+          <p:cNvSpPr txBox="1"/>
+          <p:nvPr/>
+        </p:nvSpPr>
+        <p:spPr>
+          <a:xfrm>
+            <a:off x="3935729" y="6551962"/>
+            <a:ext cx="4320540" cy="90011"/>
+          </a:xfrm>
+          <a:prstGeom prst="rect">
+            <a:avLst/>
+          </a:prstGeom>
+          <a:noFill/>
+          <a:ln w="0">
+            <a:noFill/>
+          </a:ln>
+          <a:extLst>
+            <a:ext uri="{91240B29-F687-4F45-9708-019B960494DF}">
+              <a14:hiddenLine xmlns:a14="http://schemas.microsoft.com/office/drawing/2010/main" w="0">
+                <a:solidFill>
+                  <a:srgbClr val="E1E7F3"/>
+                </a:solidFill>
+              </a14:hiddenLine>
+            </a:ext>
+          </a:extLst>
+        </p:spPr>
+        <p:txBody>
+          <a:bodyPr vert="horz" wrap="none" lIns="50406" tIns="25203" rIns="50406" bIns="25203" rtlCol="0" anchor="ctr" anchorCtr="0">
+            <a:noAutofit/>
+          </a:bodyPr>
+          <a:lstStyle/>
+          <a:p>
+            <a:pPr algn="ctr">
+              <a:lnSpc>
+                <a:spcPts val="800"/>
+              </a:lnSpc>
+            </a:pPr>
+            <a:r>
+              <a:rPr lang="en-GB" sz="600" smtClean="0">
+                <a:solidFill>
+                  <a:srgbClr val="FFFFFF"/>
+                </a:solidFill>
+                <a:latin typeface="Arial" panose="020B0604020202020204" pitchFamily="34" charset="0"/>
+              </a:rPr>
+              <a:t>Information Type: Working Standard, Disclosure Range: , Information Owner: cosma.cosmin, NTT DATA Romania</a:t>
+            </a:r>
+            <a:endParaRPr lang="en-US" sz="600">
+              <a:solidFill>
+                <a:srgbClr val="FFFFFF"/>
+              </a:solidFill>
+              <a:latin typeface="Arial" panose="020B0604020202020204" pitchFamily="34" charset="0"/>
+            </a:endParaRPr>
           </a:p>
         </p:txBody>
       </p:sp>
@@ -6266,22 +6333,288 @@
   <p:clrMapOvr>
     <a:masterClrMapping/>
   </p:clrMapOvr>
-  <mc:AlternateContent xmlns:mc="http://schemas.openxmlformats.org/markup-compatibility/2006">
-    <mc:Choice xmlns:p14="http://schemas.microsoft.com/office/powerpoint/2010/main" Requires="p14">
+  <mc:AlternateContent xmlns:mc="http://schemas.openxmlformats.org/markup-compatibility/2006" xmlns:p14="http://schemas.microsoft.com/office/powerpoint/2010/main">
+    <mc:Choice Requires="p14">
       <p:transition spd="med" p14:dur="700">
         <p:fade/>
       </p:transition>
     </mc:Choice>
-    <mc:Fallback>
+    <mc:Fallback xmlns="">
       <p:transition spd="med">
         <p:fade/>
       </p:transition>
     </mc:Fallback>
   </mc:AlternateContent>
+  <p:timing>
+    <p:tnLst>
+      <p:par>
+        <p:cTn id="1" dur="indefinite" restart="never" nodeType="tmRoot"/>
+      </p:par>
+    </p:tnLst>
+  </p:timing>
 </p:sld>
 </file>
 
 <file path=ppt/slides/slide2.xml><?xml version="1.0" encoding="utf-8"?>
+<p:sld xmlns:a="http://schemas.openxmlformats.org/drawingml/2006/main" xmlns:r="http://schemas.openxmlformats.org/officeDocument/2006/relationships" xmlns:p="http://schemas.openxmlformats.org/presentationml/2006/main">
+  <p:cSld>
+    <p:spTree>
+      <p:nvGrpSpPr>
+        <p:cNvPr id="1" name=""/>
+        <p:cNvGrpSpPr/>
+        <p:nvPr/>
+      </p:nvGrpSpPr>
+      <p:grpSpPr>
+        <a:xfrm>
+          <a:off x="0" y="0"/>
+          <a:ext cx="0" cy="0"/>
+          <a:chOff x="0" y="0"/>
+          <a:chExt cx="0" cy="0"/>
+        </a:xfrm>
+      </p:grpSpPr>
+      <p:sp>
+        <p:nvSpPr>
+          <p:cNvPr id="2" name="Title 1"/>
+          <p:cNvSpPr>
+            <a:spLocks noGrp="1"/>
+          </p:cNvSpPr>
+          <p:nvPr>
+            <p:ph type="title"/>
+          </p:nvPr>
+        </p:nvSpPr>
+        <p:spPr/>
+        <p:txBody>
+          <a:bodyPr/>
+          <a:lstStyle/>
+          <a:p>
+            <a:r>
+              <a:rPr lang="en-US" dirty="0" smtClean="0"/>
+              <a:t>Why Facebook</a:t>
+            </a:r>
+            <a:r>
+              <a:rPr lang="en-US" dirty="0" smtClean="0">
+                <a:latin typeface="Tahoma" panose="020B0604030504040204" pitchFamily="34" charset="0"/>
+                <a:ea typeface="Tahoma" panose="020B0604030504040204" pitchFamily="34" charset="0"/>
+                <a:cs typeface="Tahoma" panose="020B0604030504040204" pitchFamily="34" charset="0"/>
+              </a:rPr>
+              <a:t>?</a:t>
+            </a:r>
+            <a:endParaRPr lang="en-US" dirty="0">
+              <a:latin typeface="Tahoma" panose="020B0604030504040204" pitchFamily="34" charset="0"/>
+              <a:ea typeface="Tahoma" panose="020B0604030504040204" pitchFamily="34" charset="0"/>
+              <a:cs typeface="Tahoma" panose="020B0604030504040204" pitchFamily="34" charset="0"/>
+            </a:endParaRPr>
+          </a:p>
+        </p:txBody>
+      </p:sp>
+      <p:sp>
+        <p:nvSpPr>
+          <p:cNvPr id="3" name="Content Placeholder 2"/>
+          <p:cNvSpPr>
+            <a:spLocks noGrp="1"/>
+          </p:cNvSpPr>
+          <p:nvPr>
+            <p:ph idx="1"/>
+          </p:nvPr>
+        </p:nvSpPr>
+        <p:spPr>
+          <a:xfrm>
+            <a:off x="1104293" y="2090250"/>
+            <a:ext cx="8946541" cy="2214400"/>
+          </a:xfrm>
+        </p:spPr>
+        <p:txBody>
+          <a:bodyPr/>
+          <a:lstStyle/>
+          <a:p>
+            <a:r>
+              <a:rPr lang="en-US" dirty="0" smtClean="0"/>
+              <a:t>If you  think about social media, the first thing that you think of is Facebook.</a:t>
+            </a:r>
+          </a:p>
+          <a:p>
+            <a:endParaRPr lang="en-US" dirty="0" smtClean="0"/>
+          </a:p>
+          <a:p>
+            <a:r>
+              <a:rPr lang="en-US" dirty="0" smtClean="0"/>
+              <a:t>The API that Facebook provides offers other products that can be integrated within the app, such as analytics, messenger or jobs.</a:t>
+            </a:r>
+            <a:endParaRPr lang="en-US" dirty="0"/>
+          </a:p>
+          <a:p>
+            <a:pPr marL="0" indent="0">
+              <a:buNone/>
+            </a:pPr>
+            <a:endParaRPr lang="en-US" dirty="0"/>
+          </a:p>
+        </p:txBody>
+      </p:sp>
+      <p:sp>
+        <p:nvSpPr>
+          <p:cNvPr id="4" name="CqClassificationStamp"/>
+          <p:cNvSpPr txBox="1"/>
+          <p:nvPr/>
+        </p:nvSpPr>
+        <p:spPr>
+          <a:xfrm>
+            <a:off x="3935729" y="6551962"/>
+            <a:ext cx="4320540" cy="90011"/>
+          </a:xfrm>
+          <a:prstGeom prst="rect">
+            <a:avLst/>
+          </a:prstGeom>
+          <a:noFill/>
+          <a:ln w="0">
+            <a:noFill/>
+          </a:ln>
+          <a:extLst>
+            <a:ext uri="{91240B29-F687-4F45-9708-019B960494DF}">
+              <a14:hiddenLine xmlns:a14="http://schemas.microsoft.com/office/drawing/2010/main" w="0">
+                <a:solidFill>
+                  <a:srgbClr val="E1E7F3"/>
+                </a:solidFill>
+              </a14:hiddenLine>
+            </a:ext>
+          </a:extLst>
+        </p:spPr>
+        <p:txBody>
+          <a:bodyPr vert="horz" wrap="none" lIns="50406" tIns="25203" rIns="50406" bIns="25203" rtlCol="0" anchor="ctr" anchorCtr="0">
+            <a:noAutofit/>
+          </a:bodyPr>
+          <a:lstStyle/>
+          <a:p>
+            <a:pPr algn="ctr">
+              <a:lnSpc>
+                <a:spcPts val="800"/>
+              </a:lnSpc>
+            </a:pPr>
+            <a:r>
+              <a:rPr lang="en-GB" sz="600" dirty="0" smtClean="0">
+                <a:solidFill>
+                  <a:srgbClr val="FFFFFF"/>
+                </a:solidFill>
+                <a:latin typeface="Arial" panose="020B0604020202020204" pitchFamily="34" charset="0"/>
+              </a:rPr>
+              <a:t>Information Type: Working Standard, Disclosure Range: , Information Owner: </a:t>
+            </a:r>
+            <a:r>
+              <a:rPr lang="en-GB" sz="600" dirty="0" err="1" smtClean="0">
+                <a:solidFill>
+                  <a:srgbClr val="FFFFFF"/>
+                </a:solidFill>
+                <a:latin typeface="Arial" panose="020B0604020202020204" pitchFamily="34" charset="0"/>
+              </a:rPr>
+              <a:t>cosma.cosmin</a:t>
+            </a:r>
+            <a:r>
+              <a:rPr lang="en-GB" sz="600" dirty="0" smtClean="0">
+                <a:solidFill>
+                  <a:srgbClr val="FFFFFF"/>
+                </a:solidFill>
+                <a:latin typeface="Arial" panose="020B0604020202020204" pitchFamily="34" charset="0"/>
+              </a:rPr>
+              <a:t>, NTT DATA Romania</a:t>
+            </a:r>
+            <a:endParaRPr lang="en-US" sz="600" dirty="0">
+              <a:solidFill>
+                <a:srgbClr val="FFFFFF"/>
+              </a:solidFill>
+              <a:latin typeface="Arial" panose="020B0604020202020204" pitchFamily="34" charset="0"/>
+            </a:endParaRPr>
+          </a:p>
+        </p:txBody>
+      </p:sp>
+      <p:pic>
+        <p:nvPicPr>
+          <p:cNvPr id="7" name="Picture 6"/>
+          <p:cNvPicPr>
+            <a:picLocks noChangeAspect="1"/>
+          </p:cNvPicPr>
+          <p:nvPr/>
+        </p:nvPicPr>
+        <p:blipFill rotWithShape="1">
+          <a:blip r:embed="rId2"/>
+          <a:srcRect l="3448" t="3990" r="4343" b="7347"/>
+          <a:stretch/>
+        </p:blipFill>
+        <p:spPr>
+          <a:xfrm>
+            <a:off x="3016542" y="4466265"/>
+            <a:ext cx="1451262" cy="1671481"/>
+          </a:xfrm>
+          <a:prstGeom prst="rect">
+            <a:avLst/>
+          </a:prstGeom>
+        </p:spPr>
+      </p:pic>
+      <p:pic>
+        <p:nvPicPr>
+          <p:cNvPr id="9" name="Picture 8"/>
+          <p:cNvPicPr>
+            <a:picLocks noChangeAspect="1"/>
+          </p:cNvPicPr>
+          <p:nvPr/>
+        </p:nvPicPr>
+        <p:blipFill rotWithShape="1">
+          <a:blip r:embed="rId3"/>
+          <a:srcRect l="30066" t="12271" r="16458"/>
+          <a:stretch/>
+        </p:blipFill>
+        <p:spPr>
+          <a:xfrm>
+            <a:off x="5154916" y="4447551"/>
+            <a:ext cx="1443733" cy="1708910"/>
+          </a:xfrm>
+          <a:prstGeom prst="rect">
+            <a:avLst/>
+          </a:prstGeom>
+        </p:spPr>
+      </p:pic>
+      <p:pic>
+        <p:nvPicPr>
+          <p:cNvPr id="10" name="Picture 9"/>
+          <p:cNvPicPr>
+            <a:picLocks noChangeAspect="1"/>
+          </p:cNvPicPr>
+          <p:nvPr/>
+        </p:nvPicPr>
+        <p:blipFill rotWithShape="1">
+          <a:blip r:embed="rId4"/>
+          <a:srcRect l="5774" t="7020" r="6645" b="6609"/>
+          <a:stretch/>
+        </p:blipFill>
+        <p:spPr>
+          <a:xfrm>
+            <a:off x="7302930" y="4426671"/>
+            <a:ext cx="1419009" cy="1685017"/>
+          </a:xfrm>
+          <a:prstGeom prst="rect">
+            <a:avLst/>
+          </a:prstGeom>
+        </p:spPr>
+      </p:pic>
+    </p:spTree>
+    <p:extLst>
+      <p:ext uri="{BB962C8B-B14F-4D97-AF65-F5344CB8AC3E}">
+        <p14:creationId xmlns:p14="http://schemas.microsoft.com/office/powerpoint/2010/main" val="606908510"/>
+      </p:ext>
+    </p:extLst>
+  </p:cSld>
+  <p:clrMapOvr>
+    <a:masterClrMapping/>
+  </p:clrMapOvr>
+  <p:timing>
+    <p:tnLst>
+      <p:par>
+        <p:cTn id="1" dur="indefinite" restart="never" nodeType="tmRoot"/>
+      </p:par>
+    </p:tnLst>
+  </p:timing>
+</p:sld>
+</file>
+
+<file path=ppt/slides/slide3.xml><?xml version="1.0" encoding="utf-8"?>
 <p:sld xmlns:a="http://schemas.openxmlformats.org/drawingml/2006/main" xmlns:r="http://schemas.openxmlformats.org/officeDocument/2006/relationships" xmlns:p="http://schemas.openxmlformats.org/presentationml/2006/main">
   <p:cSld>
     <p:bg>
@@ -6314,7 +6647,7 @@
                 <a16:creationId xmlns:a16="http://schemas.microsoft.com/office/drawing/2014/main" id="{74CD14DB-BB81-479F-A1FC-1C75640E9F84}"/>
               </a:ext>
               <a:ext uri="{C183D7F6-B498-43B3-948B-1728B52AA6E4}">
-                <adec:decorative xmlns:adec="http://schemas.microsoft.com/office/drawing/2017/decorative" val="1"/>
+                <adec:decorative xmlns:adec="http://schemas.microsoft.com/office/drawing/2017/decorative" xmlns="" val="1"/>
               </a:ext>
             </a:extLst>
           </p:cNvPr>
@@ -6403,7 +6736,7 @@
                 <a16:creationId xmlns:a16="http://schemas.microsoft.com/office/drawing/2014/main" id="{C943A91B-7CA7-4592-A975-73B1BF8C4C74}"/>
               </a:ext>
               <a:ext uri="{C183D7F6-B498-43B3-948B-1728B52AA6E4}">
-                <adec:decorative xmlns:adec="http://schemas.microsoft.com/office/drawing/2017/decorative" val="1"/>
+                <adec:decorative xmlns:adec="http://schemas.microsoft.com/office/drawing/2017/decorative" xmlns="" val="1"/>
               </a:ext>
             </a:extLst>
           </p:cNvPr>
@@ -6456,7 +6789,7 @@
                 <a16:creationId xmlns:a16="http://schemas.microsoft.com/office/drawing/2014/main" id="{EC471314-E46A-414B-8D91-74880E84F187}"/>
               </a:ext>
               <a:ext uri="{C183D7F6-B498-43B3-948B-1728B52AA6E4}">
-                <adec:decorative xmlns:adec="http://schemas.microsoft.com/office/drawing/2017/decorative" val="1"/>
+                <adec:decorative xmlns:adec="http://schemas.microsoft.com/office/drawing/2017/decorative" xmlns="" val="1"/>
               </a:ext>
             </a:extLst>
           </p:cNvPr>
@@ -6845,7 +7178,7 @@
                 <a16:creationId xmlns:a16="http://schemas.microsoft.com/office/drawing/2014/main" id="{6A681326-1C9D-44A3-A627-3871BDAE4127}"/>
               </a:ext>
               <a:ext uri="{C183D7F6-B498-43B3-948B-1728B52AA6E4}">
-                <adec:decorative xmlns:adec="http://schemas.microsoft.com/office/drawing/2017/decorative" val="1"/>
+                <adec:decorative xmlns:adec="http://schemas.microsoft.com/office/drawing/2017/decorative" xmlns="" val="1"/>
               </a:ext>
             </a:extLst>
           </p:cNvPr>
@@ -7445,6 +7778,63 @@
           </a:p>
         </p:txBody>
       </p:sp>
+      <p:sp>
+        <p:nvSpPr>
+          <p:cNvPr id="5" name="CqClassificationStamp"/>
+          <p:cNvSpPr txBox="1"/>
+          <p:nvPr/>
+        </p:nvSpPr>
+        <p:spPr>
+          <a:xfrm>
+            <a:off x="3935729" y="6551962"/>
+            <a:ext cx="4320540" cy="90011"/>
+          </a:xfrm>
+          <a:prstGeom prst="rect">
+            <a:avLst/>
+          </a:prstGeom>
+          <a:noFill/>
+          <a:ln w="0">
+            <a:noFill/>
+          </a:ln>
+          <a:extLst>
+            <a:ext uri="{91240B29-F687-4F45-9708-019B960494DF}">
+              <a14:hiddenLine xmlns:a14="http://schemas.microsoft.com/office/drawing/2010/main" w="0">
+                <a:solidFill>
+                  <a:srgbClr val="E1E7F3"/>
+                </a:solidFill>
+              </a14:hiddenLine>
+            </a:ext>
+          </a:extLst>
+        </p:spPr>
+        <p:txBody>
+          <a:bodyPr vert="horz" wrap="none" lIns="50406" tIns="25203" rIns="50406" bIns="25203" rtlCol="0" anchor="ctr" anchorCtr="0">
+            <a:noAutofit/>
+          </a:bodyPr>
+          <a:lstStyle/>
+          <a:p>
+            <a:pPr algn="ctr">
+              <a:lnSpc>
+                <a:spcPts val="800"/>
+              </a:lnSpc>
+            </a:pPr>
+            <a:r>
+              <a:rPr lang="en-GB" sz="600" smtClean="0">
+                <a:solidFill>
+                  <a:srgbClr val="FFFFFF"/>
+                </a:solidFill>
+                <a:latin typeface="Arial" panose="020B0604020202020204" pitchFamily="34" charset="0"/>
+              </a:rPr>
+              <a:t>Information Type: Working Standard, Disclosure Range: , Information Owner: cosma.cosmin, NTT DATA Romania</a:t>
+            </a:r>
+            <a:endParaRPr lang="en-US" sz="600">
+              <a:solidFill>
+                <a:srgbClr val="FFFFFF"/>
+              </a:solidFill>
+              <a:latin typeface="Arial" panose="020B0604020202020204" pitchFamily="34" charset="0"/>
+            </a:endParaRPr>
+          </a:p>
+        </p:txBody>
+      </p:sp>
     </p:spTree>
     <p:extLst>
       <p:ext uri="{BB962C8B-B14F-4D97-AF65-F5344CB8AC3E}">
@@ -7454,271 +7844,6 @@
   </p:cSld>
   <p:clrMapOvr>
     <a:overrideClrMapping bg1="lt1" tx1="dk1" bg2="lt2" tx2="dk2" accent1="accent1" accent2="accent2" accent3="accent3" accent4="accent4" accent5="accent5" accent6="accent6" hlink="hlink" folHlink="folHlink"/>
-  </p:clrMapOvr>
-  <p:transition spd="slow">
-    <p:fade thruBlk="1"/>
-  </p:transition>
-</p:sld>
-</file>
-
-<file path=ppt/slides/slide3.xml><?xml version="1.0" encoding="utf-8"?>
-<p:sld xmlns:a="http://schemas.openxmlformats.org/drawingml/2006/main" xmlns:r="http://schemas.openxmlformats.org/officeDocument/2006/relationships" xmlns:p="http://schemas.openxmlformats.org/presentationml/2006/main">
-  <p:cSld>
-    <p:bg>
-      <p:bgPr>
-        <a:blipFill rotWithShape="1">
-          <a:blip r:embed="rId2">
-            <a:duotone>
-              <a:schemeClr val="bg2">
-                <a:shade val="69000"/>
-                <a:hueMod val="108000"/>
-                <a:satMod val="164000"/>
-                <a:lumMod val="74000"/>
-              </a:schemeClr>
-              <a:schemeClr val="bg2">
-                <a:tint val="96000"/>
-                <a:hueMod val="88000"/>
-                <a:satMod val="140000"/>
-                <a:lumMod val="132000"/>
-              </a:schemeClr>
-            </a:duotone>
-          </a:blip>
-          <a:stretch/>
-        </a:blipFill>
-        <a:effectLst/>
-      </p:bgPr>
-    </p:bg>
-    <p:spTree>
-      <p:nvGrpSpPr>
-        <p:cNvPr id="1" name=""/>
-        <p:cNvGrpSpPr/>
-        <p:nvPr/>
-      </p:nvGrpSpPr>
-      <p:grpSpPr>
-        <a:xfrm>
-          <a:off x="0" y="0"/>
-          <a:ext cx="0" cy="0"/>
-          <a:chOff x="0" y="0"/>
-          <a:chExt cx="0" cy="0"/>
-        </a:xfrm>
-      </p:grpSpPr>
-      <p:pic>
-        <p:nvPicPr>
-          <p:cNvPr id="22" name="Picture 3" descr="A picture containing umbrella, light, outdoor, building&#10;&#10;Description generated with very high confidence">
-            <a:extLst>
-              <a:ext uri="{FF2B5EF4-FFF2-40B4-BE49-F238E27FC236}">
-                <a16:creationId xmlns:a16="http://schemas.microsoft.com/office/drawing/2014/main" id="{F8D24652-982B-4A72-A2CC-5D56E68AC7FF}"/>
-              </a:ext>
-            </a:extLst>
-          </p:cNvPr>
-          <p:cNvPicPr>
-            <a:picLocks noChangeAspect="1"/>
-          </p:cNvPicPr>
-          <p:nvPr/>
-        </p:nvPicPr>
-        <p:blipFill rotWithShape="1">
-          <a:blip r:embed="rId3"/>
-          <a:srcRect l="14026" r="12417" b="-1"/>
-          <a:stretch/>
-        </p:blipFill>
-        <p:spPr>
-          <a:xfrm>
-            <a:off x="4634682" y="10"/>
-            <a:ext cx="7557319" cy="6857990"/>
-          </a:xfrm>
-          <a:prstGeom prst="rect">
-            <a:avLst/>
-          </a:prstGeom>
-        </p:spPr>
-      </p:pic>
-      <p:sp>
-        <p:nvSpPr>
-          <p:cNvPr id="2" name="Title 1"/>
-          <p:cNvSpPr>
-            <a:spLocks noGrp="1"/>
-          </p:cNvSpPr>
-          <p:nvPr>
-            <p:ph type="title"/>
-          </p:nvPr>
-        </p:nvSpPr>
-        <p:spPr>
-          <a:xfrm>
-            <a:off x="445709" y="1016306"/>
-            <a:ext cx="3651272" cy="1516038"/>
-          </a:xfrm>
-        </p:spPr>
-        <p:txBody>
-          <a:bodyPr>
-            <a:normAutofit fontScale="90000"/>
-          </a:bodyPr>
-          <a:lstStyle/>
-          <a:p>
-            <a:r>
-              <a:rPr lang="en-GB" sz="6000"/>
-              <a:t>Login process:</a:t>
-            </a:r>
-          </a:p>
-        </p:txBody>
-      </p:sp>
-      <p:pic>
-        <p:nvPicPr>
-          <p:cNvPr id="7" name="Picture 7" descr="&#10;&#10;Description generated with very high confidence">
-            <a:extLst>
-              <a:ext uri="{FF2B5EF4-FFF2-40B4-BE49-F238E27FC236}">
-                <a16:creationId xmlns:a16="http://schemas.microsoft.com/office/drawing/2014/main" id="{58E8343F-52ED-4161-AC16-EBEA7F9AB88D}"/>
-              </a:ext>
-            </a:extLst>
-          </p:cNvPr>
-          <p:cNvPicPr>
-            <a:picLocks noGrp="1" noChangeAspect="1"/>
-          </p:cNvPicPr>
-          <p:nvPr>
-            <p:ph idx="1"/>
-          </p:nvPr>
-        </p:nvPicPr>
-        <p:blipFill>
-          <a:blip r:embed="rId4"/>
-          <a:stretch>
-            <a:fillRect/>
-          </a:stretch>
-        </p:blipFill>
-        <p:spPr>
-          <a:xfrm>
-            <a:off x="4747893" y="1737954"/>
-            <a:ext cx="7335104" cy="3642822"/>
-          </a:xfrm>
-        </p:spPr>
-      </p:pic>
-      <p:sp>
-        <p:nvSpPr>
-          <p:cNvPr id="4" name="Text Placeholder 3">
-            <a:extLst>
-              <a:ext uri="{FF2B5EF4-FFF2-40B4-BE49-F238E27FC236}">
-                <a16:creationId xmlns:a16="http://schemas.microsoft.com/office/drawing/2014/main" id="{4E60156A-D096-4F00-9B14-7C69774779E4}"/>
-              </a:ext>
-            </a:extLst>
-          </p:cNvPr>
-          <p:cNvSpPr>
-            <a:spLocks noGrp="1"/>
-          </p:cNvSpPr>
-          <p:nvPr>
-            <p:ph type="body" sz="half" idx="2"/>
-          </p:nvPr>
-        </p:nvSpPr>
-        <p:spPr>
-          <a:xfrm>
-            <a:off x="445709" y="2697786"/>
-            <a:ext cx="3651271" cy="2812972"/>
-          </a:xfrm>
-        </p:spPr>
-        <p:style>
-          <a:lnRef idx="2">
-            <a:schemeClr val="accent5"/>
-          </a:lnRef>
-          <a:fillRef idx="1">
-            <a:schemeClr val="lt1"/>
-          </a:fillRef>
-          <a:effectRef idx="0">
-            <a:schemeClr val="accent5"/>
-          </a:effectRef>
-          <a:fontRef idx="minor">
-            <a:schemeClr val="dk1"/>
-          </a:fontRef>
-        </p:style>
-        <p:txBody>
-          <a:bodyPr vert="horz" lIns="91440" tIns="45720" rIns="91440" bIns="45720" rtlCol="0" anchor="t">
-            <a:noAutofit/>
-          </a:bodyPr>
-          <a:lstStyle/>
-          <a:p>
-            <a:pPr marL="285750" indent="-285750">
-              <a:buFont typeface="Wingdings" charset="2"/>
-              <a:buChar char="Ø"/>
-            </a:pPr>
-            <a:r>
-              <a:rPr lang="en-GB" sz="1600" dirty="0">
-                <a:latin typeface="Century Gothic"/>
-                <a:cs typeface="Times"/>
-              </a:rPr>
-              <a:t>After you click on the login button, </a:t>
-            </a:r>
-            <a:r>
-              <a:rPr lang="en-GB" sz="1600">
-                <a:latin typeface="Century Gothic"/>
-                <a:cs typeface="Times"/>
-              </a:rPr>
-              <a:t>you will be redirected to Facebook</a:t>
-            </a:r>
-            <a:r>
-              <a:rPr lang="en-GB" sz="1600" dirty="0">
-                <a:latin typeface="Century Gothic"/>
-                <a:cs typeface="Times"/>
-              </a:rPr>
-              <a:t> to enter your credentials.</a:t>
-            </a:r>
-            <a:endParaRPr lang="en-US" sz="1600">
-              <a:latin typeface="Century Gothic"/>
-              <a:cs typeface="Times"/>
-            </a:endParaRPr>
-          </a:p>
-          <a:p>
-            <a:pPr marL="285750" indent="-285750">
-              <a:buFont typeface="Wingdings" charset="2"/>
-              <a:buChar char="Ø"/>
-            </a:pPr>
-            <a:endParaRPr lang="en-GB" sz="1600" dirty="0">
-              <a:latin typeface="Century Gothic"/>
-              <a:cs typeface="Times"/>
-            </a:endParaRPr>
-          </a:p>
-          <a:p>
-            <a:pPr marL="285750" indent="-285750">
-              <a:buFont typeface="Wingdings" charset="2"/>
-              <a:buChar char="Ø"/>
-            </a:pPr>
-            <a:r>
-              <a:rPr lang="en-GB" sz="1600" dirty="0">
-                <a:latin typeface="Century Gothic"/>
-                <a:cs typeface="Times"/>
-              </a:rPr>
-              <a:t>That's it. After </a:t>
-            </a:r>
-            <a:r>
-              <a:rPr lang="en-GB" sz="1600" err="1">
-                <a:latin typeface="Century Gothic"/>
-                <a:cs typeface="Times"/>
-              </a:rPr>
-              <a:t>succesfully</a:t>
-            </a:r>
-            <a:r>
-              <a:rPr lang="en-GB" sz="1600" dirty="0">
-                <a:latin typeface="Century Gothic"/>
-                <a:cs typeface="Times"/>
-              </a:rPr>
-              <a:t> logging in </a:t>
-            </a:r>
-            <a:r>
-              <a:rPr lang="en-GB" sz="1600">
-                <a:latin typeface="Century Gothic"/>
-                <a:cs typeface="Times"/>
-              </a:rPr>
-              <a:t>you only have to wait and watch the magic happen!</a:t>
-            </a:r>
-            <a:endParaRPr lang="en-GB">
-              <a:latin typeface="Century Gothic"/>
-            </a:endParaRPr>
-          </a:p>
-        </p:txBody>
-      </p:sp>
-    </p:spTree>
-    <p:extLst>
-      <p:ext uri="{BB962C8B-B14F-4D97-AF65-F5344CB8AC3E}">
-        <p14:creationId xmlns:p14="http://schemas.microsoft.com/office/powerpoint/2010/main" val="980010426"/>
-      </p:ext>
-    </p:extLst>
-  </p:cSld>
-  <p:clrMapOvr>
-    <a:masterClrMapping/>
   </p:clrMapOvr>
   <mc:AlternateContent xmlns:mc="http://schemas.openxmlformats.org/markup-compatibility/2006">
     <mc:Choice xmlns:p14="http://schemas.microsoft.com/office/powerpoint/2010/main" Requires="p14">
@@ -7732,6 +7857,13 @@
       </p:transition>
     </mc:Fallback>
   </mc:AlternateContent>
+  <p:timing>
+    <p:tnLst>
+      <p:par>
+        <p:cTn id="1" dur="indefinite" restart="never" nodeType="tmRoot"/>
+      </p:par>
+    </p:tnLst>
+  </p:timing>
 </p:sld>
 </file>
 
@@ -7797,6 +7929,344 @@
         </p:blipFill>
         <p:spPr>
           <a:xfrm>
+            <a:off x="4634682" y="10"/>
+            <a:ext cx="7557319" cy="6857990"/>
+          </a:xfrm>
+          <a:prstGeom prst="rect">
+            <a:avLst/>
+          </a:prstGeom>
+        </p:spPr>
+      </p:pic>
+      <p:sp>
+        <p:nvSpPr>
+          <p:cNvPr id="2" name="Title 1"/>
+          <p:cNvSpPr>
+            <a:spLocks noGrp="1"/>
+          </p:cNvSpPr>
+          <p:nvPr>
+            <p:ph type="title"/>
+          </p:nvPr>
+        </p:nvSpPr>
+        <p:spPr>
+          <a:xfrm>
+            <a:off x="445709" y="1016306"/>
+            <a:ext cx="3651272" cy="1516038"/>
+          </a:xfrm>
+        </p:spPr>
+        <p:txBody>
+          <a:bodyPr>
+            <a:normAutofit fontScale="90000"/>
+          </a:bodyPr>
+          <a:lstStyle/>
+          <a:p>
+            <a:r>
+              <a:rPr lang="en-GB" sz="6000"/>
+              <a:t>Login process:</a:t>
+            </a:r>
+          </a:p>
+        </p:txBody>
+      </p:sp>
+      <p:pic>
+        <p:nvPicPr>
+          <p:cNvPr id="7" name="Picture 7" descr="&#10;&#10;Description generated with very high confidence">
+            <a:extLst>
+              <a:ext uri="{FF2B5EF4-FFF2-40B4-BE49-F238E27FC236}">
+                <a16:creationId xmlns:a16="http://schemas.microsoft.com/office/drawing/2014/main" id="{58E8343F-52ED-4161-AC16-EBEA7F9AB88D}"/>
+              </a:ext>
+            </a:extLst>
+          </p:cNvPr>
+          <p:cNvPicPr>
+            <a:picLocks noGrp="1" noChangeAspect="1"/>
+          </p:cNvPicPr>
+          <p:nvPr>
+            <p:ph idx="1"/>
+          </p:nvPr>
+        </p:nvPicPr>
+        <p:blipFill>
+          <a:blip r:embed="rId4"/>
+          <a:stretch>
+            <a:fillRect/>
+          </a:stretch>
+        </p:blipFill>
+        <p:spPr>
+          <a:xfrm>
+            <a:off x="4747893" y="1737954"/>
+            <a:ext cx="7335104" cy="3642822"/>
+          </a:xfrm>
+        </p:spPr>
+      </p:pic>
+      <p:sp>
+        <p:nvSpPr>
+          <p:cNvPr id="4" name="Text Placeholder 3">
+            <a:extLst>
+              <a:ext uri="{FF2B5EF4-FFF2-40B4-BE49-F238E27FC236}">
+                <a16:creationId xmlns:a16="http://schemas.microsoft.com/office/drawing/2014/main" id="{4E60156A-D096-4F00-9B14-7C69774779E4}"/>
+              </a:ext>
+            </a:extLst>
+          </p:cNvPr>
+          <p:cNvSpPr>
+            <a:spLocks noGrp="1"/>
+          </p:cNvSpPr>
+          <p:nvPr>
+            <p:ph type="body" sz="half" idx="2"/>
+          </p:nvPr>
+        </p:nvSpPr>
+        <p:spPr>
+          <a:xfrm>
+            <a:off x="445709" y="2697786"/>
+            <a:ext cx="3651271" cy="2812972"/>
+          </a:xfrm>
+        </p:spPr>
+        <p:style>
+          <a:lnRef idx="2">
+            <a:schemeClr val="accent5"/>
+          </a:lnRef>
+          <a:fillRef idx="1">
+            <a:schemeClr val="lt1"/>
+          </a:fillRef>
+          <a:effectRef idx="0">
+            <a:schemeClr val="accent5"/>
+          </a:effectRef>
+          <a:fontRef idx="minor">
+            <a:schemeClr val="dk1"/>
+          </a:fontRef>
+        </p:style>
+        <p:txBody>
+          <a:bodyPr vert="horz" lIns="91440" tIns="45720" rIns="91440" bIns="45720" rtlCol="0" anchor="t">
+            <a:noAutofit/>
+          </a:bodyPr>
+          <a:lstStyle/>
+          <a:p>
+            <a:pPr marL="285750" indent="-285750">
+              <a:buFont typeface="Wingdings" charset="2"/>
+              <a:buChar char="Ø"/>
+            </a:pPr>
+            <a:r>
+              <a:rPr lang="en-GB" sz="1600" dirty="0">
+                <a:latin typeface="Century Gothic"/>
+                <a:cs typeface="Times"/>
+              </a:rPr>
+              <a:t>After you click on the login button, </a:t>
+            </a:r>
+            <a:r>
+              <a:rPr lang="en-GB" sz="1600">
+                <a:latin typeface="Century Gothic"/>
+                <a:cs typeface="Times"/>
+              </a:rPr>
+              <a:t>you will be redirected to Facebook</a:t>
+            </a:r>
+            <a:r>
+              <a:rPr lang="en-GB" sz="1600" dirty="0">
+                <a:latin typeface="Century Gothic"/>
+                <a:cs typeface="Times"/>
+              </a:rPr>
+              <a:t> to enter your credentials.</a:t>
+            </a:r>
+            <a:endParaRPr lang="en-US" sz="1600">
+              <a:latin typeface="Century Gothic"/>
+              <a:cs typeface="Times"/>
+            </a:endParaRPr>
+          </a:p>
+          <a:p>
+            <a:pPr marL="285750" indent="-285750">
+              <a:buFont typeface="Wingdings" charset="2"/>
+              <a:buChar char="Ø"/>
+            </a:pPr>
+            <a:endParaRPr lang="en-GB" sz="1600" dirty="0">
+              <a:latin typeface="Century Gothic"/>
+              <a:cs typeface="Times"/>
+            </a:endParaRPr>
+          </a:p>
+          <a:p>
+            <a:pPr marL="285750" indent="-285750">
+              <a:buFont typeface="Wingdings" charset="2"/>
+              <a:buChar char="Ø"/>
+            </a:pPr>
+            <a:r>
+              <a:rPr lang="en-GB" sz="1600" dirty="0">
+                <a:latin typeface="Century Gothic"/>
+                <a:cs typeface="Times"/>
+              </a:rPr>
+              <a:t>That's it. After </a:t>
+            </a:r>
+            <a:r>
+              <a:rPr lang="en-GB" sz="1600" err="1">
+                <a:latin typeface="Century Gothic"/>
+                <a:cs typeface="Times"/>
+              </a:rPr>
+              <a:t>succesfully</a:t>
+            </a:r>
+            <a:r>
+              <a:rPr lang="en-GB" sz="1600" dirty="0">
+                <a:latin typeface="Century Gothic"/>
+                <a:cs typeface="Times"/>
+              </a:rPr>
+              <a:t> logging in </a:t>
+            </a:r>
+            <a:r>
+              <a:rPr lang="en-GB" sz="1600">
+                <a:latin typeface="Century Gothic"/>
+                <a:cs typeface="Times"/>
+              </a:rPr>
+              <a:t>you only have to wait and watch the magic happen!</a:t>
+            </a:r>
+            <a:endParaRPr lang="en-GB">
+              <a:latin typeface="Century Gothic"/>
+            </a:endParaRPr>
+          </a:p>
+        </p:txBody>
+      </p:sp>
+      <p:sp>
+        <p:nvSpPr>
+          <p:cNvPr id="3" name="CqClassificationStamp"/>
+          <p:cNvSpPr txBox="1"/>
+          <p:nvPr/>
+        </p:nvSpPr>
+        <p:spPr>
+          <a:xfrm>
+            <a:off x="3935729" y="6551962"/>
+            <a:ext cx="4320540" cy="90011"/>
+          </a:xfrm>
+          <a:prstGeom prst="rect">
+            <a:avLst/>
+          </a:prstGeom>
+          <a:noFill/>
+          <a:ln w="0">
+            <a:noFill/>
+          </a:ln>
+          <a:extLst>
+            <a:ext uri="{91240B29-F687-4F45-9708-019B960494DF}">
+              <a14:hiddenLine xmlns:a14="http://schemas.microsoft.com/office/drawing/2010/main" w="0">
+                <a:solidFill>
+                  <a:srgbClr val="E1E7F3"/>
+                </a:solidFill>
+              </a14:hiddenLine>
+            </a:ext>
+          </a:extLst>
+        </p:spPr>
+        <p:txBody>
+          <a:bodyPr vert="horz" wrap="none" lIns="50406" tIns="25203" rIns="50406" bIns="25203" rtlCol="0" anchor="ctr" anchorCtr="0">
+            <a:noAutofit/>
+          </a:bodyPr>
+          <a:lstStyle/>
+          <a:p>
+            <a:pPr algn="ctr">
+              <a:lnSpc>
+                <a:spcPts val="800"/>
+              </a:lnSpc>
+            </a:pPr>
+            <a:r>
+              <a:rPr lang="en-GB" sz="600" smtClean="0">
+                <a:solidFill>
+                  <a:srgbClr val="FFFFFF"/>
+                </a:solidFill>
+                <a:latin typeface="Arial" panose="020B0604020202020204" pitchFamily="34" charset="0"/>
+              </a:rPr>
+              <a:t>Information Type: Working Standard, Disclosure Range: , Information Owner: cosma.cosmin, NTT DATA Romania</a:t>
+            </a:r>
+            <a:endParaRPr lang="en-US" sz="600">
+              <a:solidFill>
+                <a:srgbClr val="FFFFFF"/>
+              </a:solidFill>
+              <a:latin typeface="Arial" panose="020B0604020202020204" pitchFamily="34" charset="0"/>
+            </a:endParaRPr>
+          </a:p>
+        </p:txBody>
+      </p:sp>
+    </p:spTree>
+    <p:extLst>
+      <p:ext uri="{BB962C8B-B14F-4D97-AF65-F5344CB8AC3E}">
+        <p14:creationId xmlns:p14="http://schemas.microsoft.com/office/powerpoint/2010/main" val="980010426"/>
+      </p:ext>
+    </p:extLst>
+  </p:cSld>
+  <p:clrMapOvr>
+    <a:masterClrMapping/>
+  </p:clrMapOvr>
+  <mc:AlternateContent xmlns:mc="http://schemas.openxmlformats.org/markup-compatibility/2006" xmlns:p14="http://schemas.microsoft.com/office/powerpoint/2010/main">
+    <mc:Choice Requires="p14">
+      <p:transition p14:dur="100">
+        <p:cut/>
+      </p:transition>
+    </mc:Choice>
+    <mc:Fallback xmlns="">
+      <p:transition>
+        <p:cut/>
+      </p:transition>
+    </mc:Fallback>
+  </mc:AlternateContent>
+  <p:timing>
+    <p:tnLst>
+      <p:par>
+        <p:cTn id="1" dur="indefinite" restart="never" nodeType="tmRoot"/>
+      </p:par>
+    </p:tnLst>
+  </p:timing>
+</p:sld>
+</file>
+
+<file path=ppt/slides/slide5.xml><?xml version="1.0" encoding="utf-8"?>
+<p:sld xmlns:a="http://schemas.openxmlformats.org/drawingml/2006/main" xmlns:r="http://schemas.openxmlformats.org/officeDocument/2006/relationships" xmlns:p="http://schemas.openxmlformats.org/presentationml/2006/main">
+  <p:cSld>
+    <p:bg>
+      <p:bgPr>
+        <a:blipFill rotWithShape="1">
+          <a:blip r:embed="rId2">
+            <a:duotone>
+              <a:schemeClr val="bg2">
+                <a:shade val="69000"/>
+                <a:hueMod val="108000"/>
+                <a:satMod val="164000"/>
+                <a:lumMod val="74000"/>
+              </a:schemeClr>
+              <a:schemeClr val="bg2">
+                <a:tint val="96000"/>
+                <a:hueMod val="88000"/>
+                <a:satMod val="140000"/>
+                <a:lumMod val="132000"/>
+              </a:schemeClr>
+            </a:duotone>
+          </a:blip>
+          <a:stretch/>
+        </a:blipFill>
+        <a:effectLst/>
+      </p:bgPr>
+    </p:bg>
+    <p:spTree>
+      <p:nvGrpSpPr>
+        <p:cNvPr id="1" name=""/>
+        <p:cNvGrpSpPr/>
+        <p:nvPr/>
+      </p:nvGrpSpPr>
+      <p:grpSpPr>
+        <a:xfrm>
+          <a:off x="0" y="0"/>
+          <a:ext cx="0" cy="0"/>
+          <a:chOff x="0" y="0"/>
+          <a:chExt cx="0" cy="0"/>
+        </a:xfrm>
+      </p:grpSpPr>
+      <p:pic>
+        <p:nvPicPr>
+          <p:cNvPr id="22" name="Picture 3" descr="A picture containing umbrella, light, outdoor, building&#10;&#10;Description generated with very high confidence">
+            <a:extLst>
+              <a:ext uri="{FF2B5EF4-FFF2-40B4-BE49-F238E27FC236}">
+                <a16:creationId xmlns:a16="http://schemas.microsoft.com/office/drawing/2014/main" id="{F8D24652-982B-4A72-A2CC-5D56E68AC7FF}"/>
+              </a:ext>
+            </a:extLst>
+          </p:cNvPr>
+          <p:cNvPicPr>
+            <a:picLocks noChangeAspect="1"/>
+          </p:cNvPicPr>
+          <p:nvPr/>
+        </p:nvPicPr>
+        <p:blipFill rotWithShape="1">
+          <a:blip r:embed="rId3"/>
+          <a:srcRect l="14026" r="12417" b="-1"/>
+          <a:stretch/>
+        </p:blipFill>
+        <p:spPr>
+          <a:xfrm>
             <a:off x="267398" y="170607"/>
             <a:ext cx="11367319" cy="4344528"/>
           </a:xfrm>
@@ -7990,6 +8460,63 @@
           </a:p>
         </p:txBody>
       </p:sp>
+      <p:sp>
+        <p:nvSpPr>
+          <p:cNvPr id="3" name="CqClassificationStamp"/>
+          <p:cNvSpPr txBox="1"/>
+          <p:nvPr/>
+        </p:nvSpPr>
+        <p:spPr>
+          <a:xfrm>
+            <a:off x="3935729" y="6551962"/>
+            <a:ext cx="4320540" cy="90011"/>
+          </a:xfrm>
+          <a:prstGeom prst="rect">
+            <a:avLst/>
+          </a:prstGeom>
+          <a:noFill/>
+          <a:ln w="0">
+            <a:noFill/>
+          </a:ln>
+          <a:extLst>
+            <a:ext uri="{91240B29-F687-4F45-9708-019B960494DF}">
+              <a14:hiddenLine xmlns:a14="http://schemas.microsoft.com/office/drawing/2010/main" w="0">
+                <a:solidFill>
+                  <a:srgbClr val="E1E7F3"/>
+                </a:solidFill>
+              </a14:hiddenLine>
+            </a:ext>
+          </a:extLst>
+        </p:spPr>
+        <p:txBody>
+          <a:bodyPr vert="horz" wrap="none" lIns="50406" tIns="25203" rIns="50406" bIns="25203" rtlCol="0" anchor="ctr" anchorCtr="0">
+            <a:noAutofit/>
+          </a:bodyPr>
+          <a:lstStyle/>
+          <a:p>
+            <a:pPr algn="ctr">
+              <a:lnSpc>
+                <a:spcPts val="800"/>
+              </a:lnSpc>
+            </a:pPr>
+            <a:r>
+              <a:rPr lang="en-GB" sz="600" smtClean="0">
+                <a:solidFill>
+                  <a:srgbClr val="FFFFFF"/>
+                </a:solidFill>
+                <a:latin typeface="Arial" panose="020B0604020202020204" pitchFamily="34" charset="0"/>
+              </a:rPr>
+              <a:t>Information Type: Working Standard, Disclosure Range: , Information Owner: cosma.cosmin, NTT DATA Romania</a:t>
+            </a:r>
+            <a:endParaRPr lang="en-US" sz="600">
+              <a:solidFill>
+                <a:srgbClr val="FFFFFF"/>
+              </a:solidFill>
+              <a:latin typeface="Arial" panose="020B0604020202020204" pitchFamily="34" charset="0"/>
+            </a:endParaRPr>
+          </a:p>
+        </p:txBody>
+      </p:sp>
     </p:spTree>
     <p:extLst>
       <p:ext uri="{BB962C8B-B14F-4D97-AF65-F5344CB8AC3E}">
@@ -8000,18 +8527,295 @@
   <p:clrMapOvr>
     <a:masterClrMapping/>
   </p:clrMapOvr>
-  <mc:AlternateContent xmlns:mc="http://schemas.openxmlformats.org/markup-compatibility/2006">
-    <mc:Choice xmlns:p14="http://schemas.microsoft.com/office/powerpoint/2010/main" Requires="p14">
+  <mc:AlternateContent xmlns:mc="http://schemas.openxmlformats.org/markup-compatibility/2006" xmlns:p14="http://schemas.microsoft.com/office/powerpoint/2010/main">
+    <mc:Choice Requires="p14">
       <p:transition p14:dur="100">
         <p:cut/>
       </p:transition>
     </mc:Choice>
-    <mc:Fallback>
+    <mc:Fallback xmlns="">
       <p:transition>
         <p:cut/>
       </p:transition>
     </mc:Fallback>
   </mc:AlternateContent>
+  <p:timing>
+    <p:tnLst>
+      <p:par>
+        <p:cTn id="1" dur="indefinite" restart="never" nodeType="tmRoot"/>
+      </p:par>
+    </p:tnLst>
+  </p:timing>
+</p:sld>
+</file>
+
+<file path=ppt/slides/slide6.xml><?xml version="1.0" encoding="utf-8"?>
+<p:sld xmlns:a="http://schemas.openxmlformats.org/drawingml/2006/main" xmlns:r="http://schemas.openxmlformats.org/officeDocument/2006/relationships" xmlns:p="http://schemas.openxmlformats.org/presentationml/2006/main">
+  <p:cSld>
+    <p:bg>
+      <p:bgPr>
+        <a:blipFill rotWithShape="1">
+          <a:blip r:embed="rId2">
+            <a:duotone>
+              <a:schemeClr val="bg2">
+                <a:shade val="69000"/>
+                <a:hueMod val="108000"/>
+                <a:satMod val="164000"/>
+                <a:lumMod val="74000"/>
+              </a:schemeClr>
+              <a:schemeClr val="bg2">
+                <a:tint val="96000"/>
+                <a:hueMod val="88000"/>
+                <a:satMod val="140000"/>
+                <a:lumMod val="132000"/>
+              </a:schemeClr>
+            </a:duotone>
+          </a:blip>
+          <a:stretch/>
+        </a:blipFill>
+        <a:effectLst/>
+      </p:bgPr>
+    </p:bg>
+    <p:spTree>
+      <p:nvGrpSpPr>
+        <p:cNvPr id="1" name=""/>
+        <p:cNvGrpSpPr/>
+        <p:nvPr/>
+      </p:nvGrpSpPr>
+      <p:grpSpPr>
+        <a:xfrm>
+          <a:off x="0" y="0"/>
+          <a:ext cx="0" cy="0"/>
+          <a:chOff x="0" y="0"/>
+          <a:chExt cx="0" cy="0"/>
+        </a:xfrm>
+      </p:grpSpPr>
+      <p:pic>
+        <p:nvPicPr>
+          <p:cNvPr id="22" name="Picture 3" descr="A picture containing umbrella, light, outdoor, building&#10;&#10;Description generated with very high confidence">
+            <a:extLst>
+              <a:ext uri="{FF2B5EF4-FFF2-40B4-BE49-F238E27FC236}">
+                <a16:creationId xmlns:a16="http://schemas.microsoft.com/office/drawing/2014/main" id="{F8D24652-982B-4A72-A2CC-5D56E68AC7FF}"/>
+              </a:ext>
+            </a:extLst>
+          </p:cNvPr>
+          <p:cNvPicPr>
+            <a:picLocks noChangeAspect="1"/>
+          </p:cNvPicPr>
+          <p:nvPr/>
+        </p:nvPicPr>
+        <p:blipFill rotWithShape="1">
+          <a:blip r:embed="rId3"/>
+          <a:srcRect l="14026" r="12417" b="-1"/>
+          <a:stretch/>
+        </p:blipFill>
+        <p:spPr>
+          <a:xfrm>
+            <a:off x="267398" y="170607"/>
+            <a:ext cx="11367319" cy="4344528"/>
+          </a:xfrm>
+          <a:prstGeom prst="rect">
+            <a:avLst/>
+          </a:prstGeom>
+        </p:spPr>
+      </p:pic>
+      <p:sp>
+        <p:nvSpPr>
+          <p:cNvPr id="2" name="Title 1"/>
+          <p:cNvSpPr>
+            <a:spLocks noGrp="1"/>
+          </p:cNvSpPr>
+          <p:nvPr>
+            <p:ph type="title"/>
+          </p:nvPr>
+        </p:nvSpPr>
+        <p:spPr>
+          <a:xfrm>
+            <a:off x="1223195" y="4755094"/>
+            <a:ext cx="8825657" cy="566738"/>
+          </a:xfrm>
+        </p:spPr>
+        <p:txBody>
+          <a:bodyPr>
+            <a:noAutofit/>
+          </a:bodyPr>
+          <a:lstStyle/>
+          <a:p>
+            <a:r>
+              <a:rPr lang="en-GB" sz="4800" dirty="0" smtClean="0"/>
+              <a:t>Search posts</a:t>
+            </a:r>
+            <a:r>
+              <a:rPr lang="en-GB" sz="4800" dirty="0"/>
+              <a:t>:</a:t>
+            </a:r>
+          </a:p>
+        </p:txBody>
+      </p:sp>
+      <p:sp>
+        <p:nvSpPr>
+          <p:cNvPr id="4" name="Text Placeholder 3">
+            <a:extLst>
+              <a:ext uri="{FF2B5EF4-FFF2-40B4-BE49-F238E27FC236}">
+                <a16:creationId xmlns:a16="http://schemas.microsoft.com/office/drawing/2014/main" id="{4E60156A-D096-4F00-9B14-7C69774779E4}"/>
+              </a:ext>
+            </a:extLst>
+          </p:cNvPr>
+          <p:cNvSpPr>
+            <a:spLocks noGrp="1"/>
+          </p:cNvSpPr>
+          <p:nvPr>
+            <p:ph type="body" sz="half" idx="2"/>
+          </p:nvPr>
+        </p:nvSpPr>
+        <p:spPr>
+          <a:xfrm>
+            <a:off x="1154956" y="5276340"/>
+            <a:ext cx="9712760" cy="1187472"/>
+          </a:xfrm>
+        </p:spPr>
+        <p:style>
+          <a:lnRef idx="2">
+            <a:schemeClr val="accent5"/>
+          </a:lnRef>
+          <a:fillRef idx="1">
+            <a:schemeClr val="lt1"/>
+          </a:fillRef>
+          <a:effectRef idx="0">
+            <a:schemeClr val="accent5"/>
+          </a:effectRef>
+          <a:fontRef idx="minor">
+            <a:schemeClr val="dk1"/>
+          </a:fontRef>
+        </p:style>
+        <p:txBody>
+          <a:bodyPr vert="horz" lIns="91440" tIns="45720" rIns="91440" bIns="45720" rtlCol="0" anchor="t">
+            <a:noAutofit/>
+          </a:bodyPr>
+          <a:lstStyle/>
+          <a:p>
+            <a:pPr marL="285750" indent="-285750">
+              <a:buFont typeface="Wingdings" charset="2"/>
+              <a:buChar char="Ø"/>
+            </a:pPr>
+            <a:r>
+              <a:rPr lang="en-GB" sz="1600" dirty="0" smtClean="0"/>
+              <a:t>You can search for specific posts by typing some of its content into the search bar, as showing above.</a:t>
+            </a:r>
+            <a:endParaRPr lang="en-GB" sz="1600" dirty="0"/>
+          </a:p>
+        </p:txBody>
+      </p:sp>
+      <p:pic>
+        <p:nvPicPr>
+          <p:cNvPr id="3" name="Picture 2"/>
+          <p:cNvPicPr>
+            <a:picLocks noChangeAspect="1"/>
+          </p:cNvPicPr>
+          <p:nvPr/>
+        </p:nvPicPr>
+        <p:blipFill>
+          <a:blip r:embed="rId4"/>
+          <a:stretch>
+            <a:fillRect/>
+          </a:stretch>
+        </p:blipFill>
+        <p:spPr>
+          <a:xfrm>
+            <a:off x="437001" y="774784"/>
+            <a:ext cx="11028112" cy="3352312"/>
+          </a:xfrm>
+          <a:prstGeom prst="rect">
+            <a:avLst/>
+          </a:prstGeom>
+        </p:spPr>
+      </p:pic>
+      <p:sp>
+        <p:nvSpPr>
+          <p:cNvPr id="6" name="CqClassificationStamp"/>
+          <p:cNvSpPr txBox="1"/>
+          <p:nvPr/>
+        </p:nvSpPr>
+        <p:spPr>
+          <a:xfrm>
+            <a:off x="3935729" y="6551962"/>
+            <a:ext cx="4320540" cy="90011"/>
+          </a:xfrm>
+          <a:prstGeom prst="rect">
+            <a:avLst/>
+          </a:prstGeom>
+          <a:noFill/>
+          <a:ln w="0">
+            <a:noFill/>
+          </a:ln>
+          <a:extLst>
+            <a:ext uri="{91240B29-F687-4F45-9708-019B960494DF}">
+              <a14:hiddenLine xmlns:a14="http://schemas.microsoft.com/office/drawing/2010/main" w="0">
+                <a:solidFill>
+                  <a:srgbClr val="E1E7F3"/>
+                </a:solidFill>
+              </a14:hiddenLine>
+            </a:ext>
+          </a:extLst>
+        </p:spPr>
+        <p:txBody>
+          <a:bodyPr vert="horz" wrap="none" lIns="50406" tIns="25203" rIns="50406" bIns="25203" rtlCol="0" anchor="ctr" anchorCtr="0">
+            <a:noAutofit/>
+          </a:bodyPr>
+          <a:lstStyle/>
+          <a:p>
+            <a:pPr algn="ctr">
+              <a:lnSpc>
+                <a:spcPts val="800"/>
+              </a:lnSpc>
+            </a:pPr>
+            <a:r>
+              <a:rPr lang="en-GB" sz="600" smtClean="0">
+                <a:solidFill>
+                  <a:srgbClr val="FFFFFF"/>
+                </a:solidFill>
+                <a:latin typeface="Arial" panose="020B0604020202020204" pitchFamily="34" charset="0"/>
+              </a:rPr>
+              <a:t>Information Type: Working Standard, Disclosure Range: , Information Owner: cosma.cosmin, NTT DATA Romania</a:t>
+            </a:r>
+            <a:endParaRPr lang="en-US" sz="600">
+              <a:solidFill>
+                <a:srgbClr val="FFFFFF"/>
+              </a:solidFill>
+              <a:latin typeface="Arial" panose="020B0604020202020204" pitchFamily="34" charset="0"/>
+            </a:endParaRPr>
+          </a:p>
+        </p:txBody>
+      </p:sp>
+    </p:spTree>
+    <p:extLst>
+      <p:ext uri="{BB962C8B-B14F-4D97-AF65-F5344CB8AC3E}">
+        <p14:creationId xmlns:p14="http://schemas.microsoft.com/office/powerpoint/2010/main" val="1056543127"/>
+      </p:ext>
+    </p:extLst>
+  </p:cSld>
+  <p:clrMapOvr>
+    <a:masterClrMapping/>
+  </p:clrMapOvr>
+  <mc:AlternateContent xmlns:mc="http://schemas.openxmlformats.org/markup-compatibility/2006" xmlns:p14="http://schemas.microsoft.com/office/powerpoint/2010/main">
+    <mc:Choice Requires="p14">
+      <p:transition p14:dur="100">
+        <p:cut/>
+      </p:transition>
+    </mc:Choice>
+    <mc:Fallback xmlns="">
+      <p:transition>
+        <p:cut/>
+      </p:transition>
+    </mc:Fallback>
+  </mc:AlternateContent>
+  <p:timing>
+    <p:tnLst>
+      <p:par>
+        <p:cTn id="1" dur="indefinite" restart="never" nodeType="tmRoot"/>
+      </p:par>
+    </p:tnLst>
+  </p:timing>
 </p:sld>
 </file>
 
@@ -8279,4 +9083,18 @@
     </a:ext>
   </a:extLst>
 </a:theme>
+</file>
+
+<file path=customXml/item1.xml><?xml version="1.0" encoding="utf-8"?>
+<Control xmlns="http://schemas.microsoft.com/VisualStudio/2011/storyboarding/control">
+  <Id Name="System.Storyboarding.WindowsDesktop.Keyboard" Revision="1" Stencil="System.Storyboarding.WindowsDesktop" StencilVersion="0.1"/>
+</Control>
+</file>
+
+<file path=customXml/itemProps1.xml><?xml version="1.0" encoding="utf-8"?>
+<ds:datastoreItem xmlns:ds="http://schemas.openxmlformats.org/officeDocument/2006/customXml" ds:itemID="{54E036A6-ED73-45E1-8AB6-FE5F95D1D07F}">
+  <ds:schemaRefs>
+    <ds:schemaRef ds:uri="http://schemas.microsoft.com/VisualStudio/2011/storyboarding/control"/>
+  </ds:schemaRefs>
+</ds:datastoreItem>
 </file>
</xml_diff>